<commit_message>
update choose flight code
</commit_message>
<xml_diff>
--- a/Báo cáo/Báo cáo BTL lớp 07 nhóm CAST.pptx
+++ b/Báo cáo/Báo cáo BTL lớp 07 nhóm CAST.pptx
@@ -211,7 +211,7 @@
           <a:p>
             <a:fld id="{708A476C-2B94-4769-AC6D-9DBA93E9DDD2}" type="datetimeFigureOut">
               <a:rPr lang="en-US" smtClean="0"/>
-              <a:t>11/2/2025</a:t>
+              <a:t>11/5/2025</a:t>
             </a:fld>
             <a:endParaRPr lang="en-US"/>
           </a:p>
@@ -874,6 +874,136 @@
           <a:bodyPr/>
           <a:lstStyle/>
           <a:p>
+            <a:r>
+              <a:rPr lang="en-US" dirty="0"/>
+              <a:t>2. </a:t>
+            </a:r>
+            <a:r>
+              <a:rPr lang="en-US" dirty="0" err="1"/>
+              <a:t>Hạn</a:t>
+            </a:r>
+            <a:r>
+              <a:rPr lang="en-US" dirty="0"/>
+              <a:t> </a:t>
+            </a:r>
+            <a:r>
+              <a:rPr lang="en-US" dirty="0" err="1"/>
+              <a:t>chế</a:t>
+            </a:r>
+            <a:r>
+              <a:rPr lang="en-US" dirty="0"/>
+              <a:t>:</a:t>
+            </a:r>
+          </a:p>
+          <a:p>
+            <a:r>
+              <a:rPr lang="en-US" dirty="0"/>
+              <a:t>- Các </a:t>
+            </a:r>
+            <a:r>
+              <a:rPr lang="en-US" dirty="0" err="1"/>
+              <a:t>chức</a:t>
+            </a:r>
+            <a:r>
+              <a:rPr lang="en-US" dirty="0"/>
+              <a:t> </a:t>
+            </a:r>
+            <a:r>
+              <a:rPr lang="en-US" dirty="0" err="1"/>
+              <a:t>năng</a:t>
+            </a:r>
+            <a:r>
+              <a:rPr lang="en-US" dirty="0"/>
+              <a:t> </a:t>
+            </a:r>
+            <a:r>
+              <a:rPr lang="en-US" dirty="0" err="1"/>
+              <a:t>chỉ</a:t>
+            </a:r>
+            <a:r>
+              <a:rPr lang="en-US" dirty="0"/>
+              <a:t> ở </a:t>
+            </a:r>
+            <a:r>
+              <a:rPr lang="en-US" dirty="0" err="1"/>
+              <a:t>mức</a:t>
+            </a:r>
+            <a:r>
+              <a:rPr lang="en-US" dirty="0"/>
+              <a:t> </a:t>
+            </a:r>
+            <a:r>
+              <a:rPr lang="en-US" dirty="0" err="1"/>
+              <a:t>cơ</a:t>
+            </a:r>
+            <a:r>
+              <a:rPr lang="en-US" dirty="0"/>
+              <a:t> </a:t>
+            </a:r>
+            <a:r>
+              <a:rPr lang="en-US" dirty="0" err="1"/>
+              <a:t>bản</a:t>
+            </a:r>
+            <a:r>
+              <a:rPr lang="en-US" dirty="0"/>
+              <a:t> (</a:t>
+            </a:r>
+            <a:r>
+              <a:rPr lang="en-US" dirty="0" err="1"/>
+              <a:t>chưa</a:t>
+            </a:r>
+            <a:r>
+              <a:rPr lang="en-US" dirty="0"/>
+              <a:t> </a:t>
+            </a:r>
+            <a:r>
+              <a:rPr lang="en-US" dirty="0" err="1"/>
+              <a:t>có</a:t>
+            </a:r>
+            <a:r>
+              <a:rPr lang="en-US" dirty="0"/>
+              <a:t> </a:t>
+            </a:r>
+            <a:r>
+              <a:rPr lang="en-US" dirty="0" err="1"/>
+              <a:t>hạng</a:t>
+            </a:r>
+            <a:r>
+              <a:rPr lang="en-US" dirty="0"/>
+              <a:t> </a:t>
+            </a:r>
+            <a:r>
+              <a:rPr lang="en-US" dirty="0" err="1"/>
+              <a:t>vé</a:t>
+            </a:r>
+            <a:r>
+              <a:rPr lang="en-US" dirty="0"/>
+              <a:t>, </a:t>
+            </a:r>
+            <a:r>
+              <a:rPr lang="en-US" dirty="0" err="1"/>
+              <a:t>sửa</a:t>
+            </a:r>
+            <a:r>
+              <a:rPr lang="en-US" dirty="0"/>
+              <a:t> </a:t>
+            </a:r>
+            <a:r>
+              <a:rPr lang="en-US" dirty="0" err="1"/>
+              <a:t>lỗi</a:t>
+            </a:r>
+            <a:r>
+              <a:rPr lang="en-US" dirty="0"/>
+              <a:t> </a:t>
+            </a:r>
+            <a:r>
+              <a:rPr lang="en-US" dirty="0" err="1"/>
+              <a:t>từ</a:t>
+            </a:r>
+            <a:r>
+              <a:rPr lang="en-US"/>
+              <a:t> xa).</a:t>
+            </a:r>
             <a:endParaRPr lang="en-US" dirty="0"/>
           </a:p>
         </p:txBody>
@@ -2102,7 +2232,7 @@
           <a:p>
             <a:fld id="{B56BAECA-1DFF-4A5A-A62A-752FF3A416B5}" type="datetimeFigureOut">
               <a:rPr lang="en-US" smtClean="0"/>
-              <a:t>11/2/2025</a:t>
+              <a:t>11/5/2025</a:t>
             </a:fld>
             <a:endParaRPr lang="en-US"/>
           </a:p>
@@ -2300,7 +2430,7 @@
           <a:p>
             <a:fld id="{B56BAECA-1DFF-4A5A-A62A-752FF3A416B5}" type="datetimeFigureOut">
               <a:rPr lang="en-US" smtClean="0"/>
-              <a:t>11/2/2025</a:t>
+              <a:t>11/5/2025</a:t>
             </a:fld>
             <a:endParaRPr lang="en-US"/>
           </a:p>
@@ -2508,7 +2638,7 @@
           <a:p>
             <a:fld id="{B56BAECA-1DFF-4A5A-A62A-752FF3A416B5}" type="datetimeFigureOut">
               <a:rPr lang="en-US" smtClean="0"/>
-              <a:t>11/2/2025</a:t>
+              <a:t>11/5/2025</a:t>
             </a:fld>
             <a:endParaRPr lang="en-US"/>
           </a:p>
@@ -2706,7 +2836,7 @@
           <a:p>
             <a:fld id="{B56BAECA-1DFF-4A5A-A62A-752FF3A416B5}" type="datetimeFigureOut">
               <a:rPr lang="en-US" smtClean="0"/>
-              <a:t>11/2/2025</a:t>
+              <a:t>11/5/2025</a:t>
             </a:fld>
             <a:endParaRPr lang="en-US"/>
           </a:p>
@@ -2981,7 +3111,7 @@
           <a:p>
             <a:fld id="{B56BAECA-1DFF-4A5A-A62A-752FF3A416B5}" type="datetimeFigureOut">
               <a:rPr lang="en-US" smtClean="0"/>
-              <a:t>11/2/2025</a:t>
+              <a:t>11/5/2025</a:t>
             </a:fld>
             <a:endParaRPr lang="en-US"/>
           </a:p>
@@ -3246,7 +3376,7 @@
           <a:p>
             <a:fld id="{B56BAECA-1DFF-4A5A-A62A-752FF3A416B5}" type="datetimeFigureOut">
               <a:rPr lang="en-US" smtClean="0"/>
-              <a:t>11/2/2025</a:t>
+              <a:t>11/5/2025</a:t>
             </a:fld>
             <a:endParaRPr lang="en-US"/>
           </a:p>
@@ -3658,7 +3788,7 @@
           <a:p>
             <a:fld id="{B56BAECA-1DFF-4A5A-A62A-752FF3A416B5}" type="datetimeFigureOut">
               <a:rPr lang="en-US" smtClean="0"/>
-              <a:t>11/2/2025</a:t>
+              <a:t>11/5/2025</a:t>
             </a:fld>
             <a:endParaRPr lang="en-US"/>
           </a:p>
@@ -3799,7 +3929,7 @@
           <a:p>
             <a:fld id="{B56BAECA-1DFF-4A5A-A62A-752FF3A416B5}" type="datetimeFigureOut">
               <a:rPr lang="en-US" smtClean="0"/>
-              <a:t>11/2/2025</a:t>
+              <a:t>11/5/2025</a:t>
             </a:fld>
             <a:endParaRPr lang="en-US"/>
           </a:p>
@@ -3912,7 +4042,7 @@
           <a:p>
             <a:fld id="{B56BAECA-1DFF-4A5A-A62A-752FF3A416B5}" type="datetimeFigureOut">
               <a:rPr lang="en-US" smtClean="0"/>
-              <a:t>11/2/2025</a:t>
+              <a:t>11/5/2025</a:t>
             </a:fld>
             <a:endParaRPr lang="en-US"/>
           </a:p>
@@ -4223,7 +4353,7 @@
           <a:p>
             <a:fld id="{B56BAECA-1DFF-4A5A-A62A-752FF3A416B5}" type="datetimeFigureOut">
               <a:rPr lang="en-US" smtClean="0"/>
-              <a:t>11/2/2025</a:t>
+              <a:t>11/5/2025</a:t>
             </a:fld>
             <a:endParaRPr lang="en-US"/>
           </a:p>
@@ -4511,7 +4641,7 @@
           <a:p>
             <a:fld id="{B56BAECA-1DFF-4A5A-A62A-752FF3A416B5}" type="datetimeFigureOut">
               <a:rPr lang="en-US" smtClean="0"/>
-              <a:t>11/2/2025</a:t>
+              <a:t>11/5/2025</a:t>
             </a:fld>
             <a:endParaRPr lang="en-US"/>
           </a:p>
@@ -4752,7 +4882,7 @@
           <a:p>
             <a:fld id="{B56BAECA-1DFF-4A5A-A62A-752FF3A416B5}" type="datetimeFigureOut">
               <a:rPr lang="en-US" smtClean="0"/>
-              <a:t>11/2/2025</a:t>
+              <a:t>11/5/2025</a:t>
             </a:fld>
             <a:endParaRPr lang="en-US"/>
           </a:p>
@@ -6130,7 +6260,7 @@
         </p:nvSpPr>
         <p:spPr>
           <a:xfrm>
-            <a:off x="220718" y="3142888"/>
+            <a:off x="220718" y="2610103"/>
             <a:ext cx="3851172" cy="830997"/>
           </a:xfrm>
           <a:prstGeom prst="rect">
@@ -6240,10 +6370,10 @@
       </p:sp>
       <p:pic>
         <p:nvPicPr>
-          <p:cNvPr id="3" name="Picture 2" descr="A screenshot of a computer&#10;&#10;AI-generated content may be incorrect.">
-            <a:extLst>
-              <a:ext uri="{FF2B5EF4-FFF2-40B4-BE49-F238E27FC236}">
-                <a16:creationId xmlns:a16="http://schemas.microsoft.com/office/drawing/2014/main" id="{9BF5BC47-BF12-0FBB-D1FB-B9865C0E824B}"/>
+          <p:cNvPr id="11" name="Picture 10">
+            <a:extLst>
+              <a:ext uri="{FF2B5EF4-FFF2-40B4-BE49-F238E27FC236}">
+                <a16:creationId xmlns:a16="http://schemas.microsoft.com/office/drawing/2014/main" id="{4AC425C8-E99E-0C81-B419-6A88F5FF81DA}"/>
               </a:ext>
             </a:extLst>
           </p:cNvPr>
@@ -6260,8 +6390,8 @@
         </p:blipFill>
         <p:spPr>
           <a:xfrm>
-            <a:off x="4280326" y="916619"/>
-            <a:ext cx="7375646" cy="4699534"/>
+            <a:off x="3933343" y="755870"/>
+            <a:ext cx="8037939" cy="5124186"/>
           </a:xfrm>
           <a:prstGeom prst="rect">
             <a:avLst/>
@@ -9368,14 +9498,14 @@
                 <a:latin typeface="Times New Roman" panose="02020603050405020304" pitchFamily="18" charset="0"/>
                 <a:cs typeface="Times New Roman" panose="02020603050405020304" pitchFamily="18" charset="0"/>
               </a:rPr>
-              <a:t>    - Giao </a:t>
+              <a:t>    - </a:t>
             </a:r>
             <a:r>
               <a:rPr lang="en-US" sz="2400" dirty="0" err="1">
                 <a:latin typeface="Times New Roman" panose="02020603050405020304" pitchFamily="18" charset="0"/>
                 <a:cs typeface="Times New Roman" panose="02020603050405020304" pitchFamily="18" charset="0"/>
               </a:rPr>
-              <a:t>diện</a:t>
+              <a:t>Chưa</a:t>
             </a:r>
             <a:r>
               <a:rPr lang="en-US" sz="2400" dirty="0">
@@ -9389,7 +9519,7 @@
                 <a:latin typeface="Times New Roman" panose="02020603050405020304" pitchFamily="18" charset="0"/>
                 <a:cs typeface="Times New Roman" panose="02020603050405020304" pitchFamily="18" charset="0"/>
               </a:rPr>
-              <a:t>chưa</a:t>
+              <a:t>có</a:t>
             </a:r>
             <a:r>
               <a:rPr lang="en-US" sz="2400" dirty="0">
@@ -9403,7 +9533,7 @@
                 <a:latin typeface="Times New Roman" panose="02020603050405020304" pitchFamily="18" charset="0"/>
                 <a:cs typeface="Times New Roman" panose="02020603050405020304" pitchFamily="18" charset="0"/>
               </a:rPr>
-              <a:t>thân</a:t>
+              <a:t>hướng</a:t>
             </a:r>
             <a:r>
               <a:rPr lang="en-US" sz="2400" dirty="0">
@@ -9417,7 +9547,7 @@
                 <a:latin typeface="Times New Roman" panose="02020603050405020304" pitchFamily="18" charset="0"/>
                 <a:cs typeface="Times New Roman" panose="02020603050405020304" pitchFamily="18" charset="0"/>
               </a:rPr>
-              <a:t>thiện</a:t>
+              <a:t>dẫn</a:t>
             </a:r>
             <a:r>
               <a:rPr lang="en-US" sz="2400" dirty="0">
@@ -9431,7 +9561,7 @@
                 <a:latin typeface="Times New Roman" panose="02020603050405020304" pitchFamily="18" charset="0"/>
                 <a:cs typeface="Times New Roman" panose="02020603050405020304" pitchFamily="18" charset="0"/>
               </a:rPr>
-              <a:t>với</a:t>
+              <a:t>cho</a:t>
             </a:r>
             <a:r>
               <a:rPr lang="en-US" sz="2400" dirty="0">

</xml_diff>